<commit_message>
Refresh Cognitive services (Azre AI Services) presentation
</commit_message>
<xml_diff>
--- a/Lab8-CognitiveServices/Cognitive-services.pptx
+++ b/Lab8-CognitiveServices/Cognitive-services.pptx
@@ -5,17 +5,18 @@
     <p:sldMasterId id="2147483794" r:id="rId1"/>
   </p:sldMasterIdLst>
   <p:notesMasterIdLst>
-    <p:notesMasterId r:id="rId10"/>
+    <p:notesMasterId r:id="rId11"/>
   </p:notesMasterIdLst>
   <p:sldIdLst>
     <p:sldId id="256" r:id="rId2"/>
     <p:sldId id="329" r:id="rId3"/>
     <p:sldId id="330" r:id="rId4"/>
-    <p:sldId id="331" r:id="rId5"/>
-    <p:sldId id="332" r:id="rId6"/>
-    <p:sldId id="333" r:id="rId7"/>
-    <p:sldId id="334" r:id="rId8"/>
-    <p:sldId id="304" r:id="rId9"/>
+    <p:sldId id="336" r:id="rId5"/>
+    <p:sldId id="331" r:id="rId6"/>
+    <p:sldId id="332" r:id="rId7"/>
+    <p:sldId id="335" r:id="rId8"/>
+    <p:sldId id="337" r:id="rId9"/>
+    <p:sldId id="304" r:id="rId10"/>
   </p:sldIdLst>
   <p:sldSz cx="12192000" cy="6858000"/>
   <p:notesSz cx="6858000" cy="9144000"/>
@@ -246,7 +247,7 @@
             <a:fld id="{A74C3DD1-6B4C-423E-A696-BD4124EC33BC}" type="datetimeFigureOut">
               <a:rPr lang="cs-CZ" smtClean="0"/>
               <a:pPr/>
-              <a:t>02.04.2023</a:t>
+              <a:t>09.04.2024</a:t>
             </a:fld>
             <a:endParaRPr lang="cs-CZ" dirty="0"/>
           </a:p>
@@ -534,6 +535,91 @@
       </p:grpSpPr>
       <p:sp>
         <p:nvSpPr>
+          <p:cNvPr id="2" name="Slide Image Placeholder 1"/>
+          <p:cNvSpPr>
+            <a:spLocks noGrp="1" noRot="1" noChangeAspect="1"/>
+          </p:cNvSpPr>
+          <p:nvPr>
+            <p:ph type="sldImg"/>
+          </p:nvPr>
+        </p:nvSpPr>
+        <p:spPr/>
+      </p:sp>
+      <p:sp>
+        <p:nvSpPr>
+          <p:cNvPr id="3" name="Notes Placeholder 2"/>
+          <p:cNvSpPr>
+            <a:spLocks noGrp="1"/>
+          </p:cNvSpPr>
+          <p:nvPr>
+            <p:ph type="body" idx="1"/>
+          </p:nvPr>
+        </p:nvSpPr>
+        <p:spPr/>
+        <p:txBody>
+          <a:bodyPr/>
+          <a:lstStyle/>
+          <a:p>
+            <a:endParaRPr lang="cs-CZ" dirty="0"/>
+          </a:p>
+        </p:txBody>
+      </p:sp>
+      <p:sp>
+        <p:nvSpPr>
+          <p:cNvPr id="4" name="Slide Number Placeholder 3"/>
+          <p:cNvSpPr>
+            <a:spLocks noGrp="1"/>
+          </p:cNvSpPr>
+          <p:nvPr>
+            <p:ph type="sldNum" sz="quarter" idx="5"/>
+          </p:nvPr>
+        </p:nvSpPr>
+        <p:spPr/>
+        <p:txBody>
+          <a:bodyPr/>
+          <a:lstStyle/>
+          <a:p>
+            <a:fld id="{A16764F6-20DF-4459-862B-64827B1A3974}" type="slidenum">
+              <a:rPr lang="cs-CZ" smtClean="0"/>
+              <a:pPr/>
+              <a:t>4</a:t>
+            </a:fld>
+            <a:endParaRPr lang="cs-CZ" dirty="0"/>
+          </a:p>
+        </p:txBody>
+      </p:sp>
+    </p:spTree>
+    <p:extLst>
+      <p:ext uri="{BB962C8B-B14F-4D97-AF65-F5344CB8AC3E}">
+        <p14:creationId xmlns:p14="http://schemas.microsoft.com/office/powerpoint/2010/main" val="2140652344"/>
+      </p:ext>
+    </p:extLst>
+  </p:cSld>
+  <p:clrMapOvr>
+    <a:masterClrMapping/>
+  </p:clrMapOvr>
+</p:notes>
+</file>
+
+<file path=ppt/notesSlides/notesSlide2.xml><?xml version="1.0" encoding="utf-8"?>
+<p:notes xmlns:a="http://schemas.openxmlformats.org/drawingml/2006/main" xmlns:r="http://schemas.openxmlformats.org/officeDocument/2006/relationships" xmlns:p="http://schemas.openxmlformats.org/presentationml/2006/main">
+  <p:cSld>
+    <p:spTree>
+      <p:nvGrpSpPr>
+        <p:cNvPr id="1" name=""/>
+        <p:cNvGrpSpPr/>
+        <p:nvPr/>
+      </p:nvGrpSpPr>
+      <p:grpSpPr>
+        <a:xfrm>
+          <a:off x="0" y="0"/>
+          <a:ext cx="0" cy="0"/>
+          <a:chOff x="0" y="0"/>
+          <a:chExt cx="0" cy="0"/>
+        </a:xfrm>
+      </p:grpSpPr>
+      <p:sp>
+        <p:nvSpPr>
           <p:cNvPr id="2" name="Zástupný symbol pro obrázek snímku 1"/>
           <p:cNvSpPr>
             <a:spLocks noGrp="1" noRot="1" noChangeAspect="1"/>
@@ -585,7 +671,7 @@
             <a:fld id="{A16764F6-20DF-4459-862B-64827B1A3974}" type="slidenum">
               <a:rPr lang="cs-CZ" smtClean="0"/>
               <a:pPr/>
-              <a:t>8</a:t>
+              <a:t>9</a:t>
             </a:fld>
             <a:endParaRPr lang="cs-CZ" dirty="0"/>
           </a:p>
@@ -802,7 +888,7 @@
           <a:p>
             <a:fld id="{0DA6F2F8-F70A-47D7-AD2D-4F12E71A0C18}" type="datetimeFigureOut">
               <a:rPr lang="cs-CZ" smtClean="0"/>
-              <a:t>02.04.2023</a:t>
+              <a:t>09.04.2024</a:t>
             </a:fld>
             <a:endParaRPr lang="cs-CZ"/>
           </a:p>
@@ -983,7 +1069,7 @@
           <a:p>
             <a:fld id="{0DA6F2F8-F70A-47D7-AD2D-4F12E71A0C18}" type="datetimeFigureOut">
               <a:rPr lang="cs-CZ" smtClean="0"/>
-              <a:t>02.04.2023</a:t>
+              <a:t>09.04.2024</a:t>
             </a:fld>
             <a:endParaRPr lang="cs-CZ"/>
           </a:p>
@@ -1174,7 +1260,7 @@
           <a:p>
             <a:fld id="{0DA6F2F8-F70A-47D7-AD2D-4F12E71A0C18}" type="datetimeFigureOut">
               <a:rPr lang="cs-CZ" smtClean="0"/>
-              <a:t>02.04.2023</a:t>
+              <a:t>09.04.2024</a:t>
             </a:fld>
             <a:endParaRPr lang="cs-CZ"/>
           </a:p>
@@ -1389,7 +1475,7 @@
           <a:p>
             <a:fld id="{0DA6F2F8-F70A-47D7-AD2D-4F12E71A0C18}" type="datetimeFigureOut">
               <a:rPr lang="cs-CZ" smtClean="0"/>
-              <a:t>02.04.2023</a:t>
+              <a:t>09.04.2024</a:t>
             </a:fld>
             <a:endParaRPr lang="cs-CZ"/>
           </a:p>
@@ -1664,7 +1750,7 @@
           <a:p>
             <a:fld id="{0DA6F2F8-F70A-47D7-AD2D-4F12E71A0C18}" type="datetimeFigureOut">
               <a:rPr lang="cs-CZ" smtClean="0"/>
-              <a:t>02.04.2023</a:t>
+              <a:t>09.04.2024</a:t>
             </a:fld>
             <a:endParaRPr lang="cs-CZ"/>
           </a:p>
@@ -1981,7 +2067,7 @@
           <a:p>
             <a:fld id="{0DA6F2F8-F70A-47D7-AD2D-4F12E71A0C18}" type="datetimeFigureOut">
               <a:rPr lang="cs-CZ" smtClean="0"/>
-              <a:t>02.04.2023</a:t>
+              <a:t>09.04.2024</a:t>
             </a:fld>
             <a:endParaRPr lang="cs-CZ" dirty="0"/>
           </a:p>
@@ -2431,7 +2517,7 @@
           <a:p>
             <a:fld id="{0DA6F2F8-F70A-47D7-AD2D-4F12E71A0C18}" type="datetimeFigureOut">
               <a:rPr lang="cs-CZ" smtClean="0"/>
-              <a:t>02.04.2023</a:t>
+              <a:t>09.04.2024</a:t>
             </a:fld>
             <a:endParaRPr lang="cs-CZ"/>
           </a:p>
@@ -2578,7 +2664,7 @@
           <a:p>
             <a:fld id="{0DA6F2F8-F70A-47D7-AD2D-4F12E71A0C18}" type="datetimeFigureOut">
               <a:rPr lang="cs-CZ" smtClean="0"/>
-              <a:t>02.04.2023</a:t>
+              <a:t>09.04.2024</a:t>
             </a:fld>
             <a:endParaRPr lang="cs-CZ"/>
           </a:p>
@@ -2685,7 +2771,7 @@
           <a:p>
             <a:fld id="{0DA6F2F8-F70A-47D7-AD2D-4F12E71A0C18}" type="datetimeFigureOut">
               <a:rPr lang="cs-CZ" smtClean="0"/>
-              <a:t>02.04.2023</a:t>
+              <a:t>09.04.2024</a:t>
             </a:fld>
             <a:endParaRPr lang="cs-CZ"/>
           </a:p>
@@ -2976,7 +3062,7 @@
           <a:p>
             <a:fld id="{0DA6F2F8-F70A-47D7-AD2D-4F12E71A0C18}" type="datetimeFigureOut">
               <a:rPr lang="cs-CZ" smtClean="0"/>
-              <a:t>02.04.2023</a:t>
+              <a:t>09.04.2024</a:t>
             </a:fld>
             <a:endParaRPr lang="cs-CZ"/>
           </a:p>
@@ -3245,7 +3331,7 @@
           <a:p>
             <a:fld id="{0DA6F2F8-F70A-47D7-AD2D-4F12E71A0C18}" type="datetimeFigureOut">
               <a:rPr lang="cs-CZ" smtClean="0"/>
-              <a:t>02.04.2023</a:t>
+              <a:t>09.04.2024</a:t>
             </a:fld>
             <a:endParaRPr lang="cs-CZ"/>
           </a:p>
@@ -3509,7 +3595,7 @@
           <a:p>
             <a:fld id="{0DA6F2F8-F70A-47D7-AD2D-4F12E71A0C18}" type="datetimeFigureOut">
               <a:rPr lang="cs-CZ" smtClean="0"/>
-              <a:t>02.04.2023</a:t>
+              <a:t>09.04.2024</a:t>
             </a:fld>
             <a:endParaRPr lang="cs-CZ"/>
           </a:p>
@@ -3925,16 +4011,12 @@
           <a:lstStyle/>
           <a:p>
             <a:r>
-              <a:rPr lang="cs-CZ" dirty="0" err="1"/>
-              <a:t>Cognitive</a:t>
+              <a:rPr lang="en-US" dirty="0"/>
+              <a:t>Azure AI</a:t>
             </a:r>
             <a:r>
               <a:rPr lang="cs-CZ" dirty="0"/>
-              <a:t> </a:t>
-            </a:r>
-            <a:r>
-              <a:rPr lang="cs-CZ" dirty="0" err="1"/>
-              <a:t>Services</a:t>
+              <a:t> Services</a:t>
             </a:r>
             <a:endParaRPr lang="en-US" dirty="0"/>
           </a:p>
@@ -4086,16 +4168,12 @@
           <a:lstStyle/>
           <a:p>
             <a:r>
-              <a:rPr lang="cs-CZ" dirty="0" err="1"/>
-              <a:t>Cognitive</a:t>
+              <a:rPr lang="en-US" dirty="0"/>
+              <a:t>Azure AI</a:t>
             </a:r>
             <a:r>
               <a:rPr lang="cs-CZ" dirty="0"/>
-              <a:t> </a:t>
-            </a:r>
-            <a:r>
-              <a:rPr lang="cs-CZ" dirty="0" err="1"/>
-              <a:t>Services</a:t>
+              <a:t> Services</a:t>
             </a:r>
             <a:endParaRPr lang="en-GB" dirty="0"/>
           </a:p>
@@ -4125,115 +4203,66 @@
           <a:lstStyle/>
           <a:p>
             <a:r>
-              <a:rPr lang="cs-CZ" dirty="0"/>
+              <a:rPr lang="en-US" dirty="0">
+                <a:hlinkClick r:id="rId2"/>
+              </a:rPr>
+              <a:t>Azure OpenAI Service</a:t>
+            </a:r>
+            <a:endParaRPr lang="en-US" dirty="0"/>
+          </a:p>
+          <a:p>
+            <a:r>
+              <a:rPr lang="en-US" dirty="0">
+                <a:hlinkClick r:id="rId3"/>
+              </a:rPr>
+              <a:t>Azure AI </a:t>
+            </a:r>
+            <a:r>
+              <a:rPr lang="cs-CZ" dirty="0">
+                <a:hlinkClick r:id="rId3"/>
+              </a:rPr>
               <a:t>Vision</a:t>
             </a:r>
-          </a:p>
-          <a:p>
-            <a:pPr lvl="1"/>
-            <a:r>
-              <a:rPr lang="en-US" dirty="0"/>
-              <a:t>Image Analysis, spatial Analysis, OCR, </a:t>
-            </a:r>
-            <a:r>
-              <a:rPr lang="cs-CZ" dirty="0"/>
-              <a:t>Video </a:t>
-            </a:r>
-            <a:r>
-              <a:rPr lang="cs-CZ" dirty="0" err="1"/>
-              <a:t>Indexer</a:t>
-            </a:r>
-            <a:r>
-              <a:rPr lang="en-US" dirty="0"/>
-              <a:t>, Facial Recognition</a:t>
-            </a:r>
             <a:endParaRPr lang="cs-CZ" dirty="0"/>
           </a:p>
           <a:p>
             <a:r>
-              <a:rPr lang="cs-CZ" dirty="0" err="1"/>
+              <a:rPr lang="en-US" dirty="0">
+                <a:hlinkClick r:id="rId4"/>
+              </a:rPr>
+              <a:t>Azure AI </a:t>
+            </a:r>
+            <a:r>
+              <a:rPr lang="cs-CZ" dirty="0">
+                <a:hlinkClick r:id="rId4"/>
+              </a:rPr>
               <a:t>Speech</a:t>
             </a:r>
+            <a:endParaRPr lang="en-US" dirty="0"/>
+          </a:p>
+          <a:p>
+            <a:r>
+              <a:rPr lang="en-US" dirty="0">
+                <a:hlinkClick r:id="rId5"/>
+              </a:rPr>
+              <a:t>Azure AI Language</a:t>
+            </a:r>
+            <a:endParaRPr lang="en-US" dirty="0"/>
+          </a:p>
+          <a:p>
+            <a:r>
+              <a:rPr lang="en-US" dirty="0">
+                <a:hlinkClick r:id="rId6"/>
+              </a:rPr>
+              <a:t>Azure AI Translation</a:t>
+            </a:r>
+            <a:endParaRPr lang="en-US" dirty="0"/>
+          </a:p>
+          <a:p>
             <a:endParaRPr lang="cs-CZ" dirty="0"/>
           </a:p>
           <a:p>
-            <a:pPr lvl="1"/>
-            <a:r>
-              <a:rPr lang="cs-CZ" dirty="0" err="1"/>
-              <a:t>Speech</a:t>
-            </a:r>
-            <a:r>
-              <a:rPr lang="cs-CZ" dirty="0"/>
-              <a:t> to </a:t>
-            </a:r>
-            <a:r>
-              <a:rPr lang="en-US" dirty="0"/>
-              <a:t>t</a:t>
-            </a:r>
-            <a:r>
-              <a:rPr lang="cs-CZ" dirty="0" err="1"/>
-              <a:t>ext</a:t>
-            </a:r>
-            <a:r>
-              <a:rPr lang="en-US" dirty="0"/>
-              <a:t>, </a:t>
-            </a:r>
-            <a:r>
-              <a:rPr lang="cs-CZ" dirty="0"/>
-              <a:t>Text to </a:t>
-            </a:r>
-            <a:r>
-              <a:rPr lang="en-US" dirty="0"/>
-              <a:t>s</a:t>
-            </a:r>
-            <a:r>
-              <a:rPr lang="cs-CZ" dirty="0" err="1"/>
-              <a:t>peech</a:t>
-            </a:r>
-            <a:r>
-              <a:rPr lang="en-US" dirty="0"/>
-              <a:t>, </a:t>
-            </a:r>
-            <a:r>
-              <a:rPr lang="cs-CZ" dirty="0" err="1"/>
-              <a:t>Speaker</a:t>
-            </a:r>
-            <a:r>
-              <a:rPr lang="cs-CZ" dirty="0"/>
-              <a:t> </a:t>
-            </a:r>
-            <a:r>
-              <a:rPr lang="en-US" dirty="0"/>
-              <a:t>r</a:t>
-            </a:r>
-            <a:r>
-              <a:rPr lang="cs-CZ" dirty="0" err="1"/>
-              <a:t>ecognition</a:t>
-            </a:r>
-            <a:r>
-              <a:rPr lang="en-US" dirty="0"/>
-              <a:t>, </a:t>
-            </a:r>
-            <a:r>
-              <a:rPr lang="cs-CZ" dirty="0" err="1"/>
-              <a:t>Speech</a:t>
-            </a:r>
-            <a:r>
-              <a:rPr lang="cs-CZ" dirty="0"/>
-              <a:t> </a:t>
-            </a:r>
-            <a:r>
-              <a:rPr lang="en-US" dirty="0"/>
-              <a:t>t</a:t>
-            </a:r>
-            <a:r>
-              <a:rPr lang="cs-CZ" dirty="0" err="1"/>
-              <a:t>ranslation</a:t>
-            </a:r>
             <a:endParaRPr lang="cs-CZ" dirty="0"/>
-          </a:p>
-          <a:p>
-            <a:endParaRPr lang="en-GB" dirty="0"/>
           </a:p>
         </p:txBody>
       </p:sp>
@@ -4261,75 +4290,109 @@
           <a:lstStyle/>
           <a:p>
             <a:r>
-              <a:rPr lang="cs-CZ" dirty="0" err="1"/>
-              <a:t>Language</a:t>
-            </a:r>
-            <a:r>
-              <a:rPr lang="cs-CZ" dirty="0"/>
-              <a:t> </a:t>
-            </a:r>
-            <a:r>
-              <a:rPr lang="cs-CZ" dirty="0" err="1"/>
-              <a:t>understanding</a:t>
-            </a:r>
-            <a:endParaRPr lang="cs-CZ" dirty="0"/>
-          </a:p>
-          <a:p>
-            <a:pPr lvl="1"/>
-            <a:r>
-              <a:rPr lang="cs-CZ" dirty="0"/>
-              <a:t>Text </a:t>
-            </a:r>
-            <a:r>
-              <a:rPr lang="cs-CZ" dirty="0" err="1"/>
-              <a:t>Analysis</a:t>
-            </a:r>
-            <a:r>
-              <a:rPr lang="en-US" dirty="0"/>
-              <a:t>, </a:t>
-            </a:r>
-            <a:r>
-              <a:rPr lang="cs-CZ" dirty="0"/>
-              <a:t>Text </a:t>
-            </a:r>
-            <a:r>
-              <a:rPr lang="cs-CZ" dirty="0" err="1"/>
-              <a:t>Translation</a:t>
+              <a:rPr lang="en-US" dirty="0">
+                <a:hlinkClick r:id="rId7"/>
+              </a:rPr>
+              <a:t>Azure AI Search</a:t>
             </a:r>
             <a:endParaRPr lang="en-US" dirty="0"/>
           </a:p>
           <a:p>
             <a:r>
-              <a:rPr lang="en-US" dirty="0"/>
-              <a:t>Decision</a:t>
-            </a:r>
-            <a:endParaRPr lang="cs-CZ" dirty="0"/>
-          </a:p>
-          <a:p>
-            <a:pPr lvl="1"/>
-            <a:r>
-              <a:rPr lang="cs-CZ" dirty="0" err="1"/>
-              <a:t>Anomaly</a:t>
-            </a:r>
-            <a:r>
-              <a:rPr lang="cs-CZ" dirty="0"/>
-              <a:t> </a:t>
-            </a:r>
-            <a:r>
-              <a:rPr lang="cs-CZ" dirty="0" err="1"/>
-              <a:t>Detection</a:t>
-            </a:r>
-            <a:r>
-              <a:rPr lang="en-US" dirty="0"/>
-              <a:t>, Content Moderator, Personalizer</a:t>
-            </a:r>
-            <a:endParaRPr lang="cs-CZ" dirty="0"/>
-          </a:p>
-          <a:p>
-            <a:r>
-              <a:rPr lang="en-US" dirty="0"/>
-              <a:t>Azure OpenAI</a:t>
-            </a:r>
+              <a:rPr lang="en-US" dirty="0">
+                <a:hlinkClick r:id="rId8"/>
+              </a:rPr>
+              <a:t>Azure AI Content Safety</a:t>
+            </a:r>
+            <a:endParaRPr lang="en-US" dirty="0"/>
+          </a:p>
+          <a:p>
+            <a:r>
+              <a:rPr lang="en-US" dirty="0">
+                <a:solidFill>
+                  <a:srgbClr val="000000"/>
+                </a:solidFill>
+                <a:highlight>
+                  <a:srgbClr val="FFFFFF"/>
+                </a:highlight>
+                <a:latin typeface="Segoe UI" panose="020B0502040204020203" pitchFamily="34" charset="0"/>
+                <a:hlinkClick r:id="rId9"/>
+              </a:rPr>
+              <a:t>Azure Machine Learning</a:t>
+            </a:r>
+            <a:endParaRPr lang="en-US" dirty="0">
+              <a:solidFill>
+                <a:srgbClr val="000000"/>
+              </a:solidFill>
+              <a:highlight>
+                <a:srgbClr val="FFFFFF"/>
+              </a:highlight>
+              <a:latin typeface="Segoe UI" panose="020B0502040204020203" pitchFamily="34" charset="0"/>
+            </a:endParaRPr>
+          </a:p>
+          <a:p>
+            <a:r>
+              <a:rPr lang="en-US" dirty="0">
+                <a:solidFill>
+                  <a:srgbClr val="000000"/>
+                </a:solidFill>
+                <a:highlight>
+                  <a:srgbClr val="FFFFFF"/>
+                </a:highlight>
+                <a:latin typeface="Segoe UI" panose="020B0502040204020203" pitchFamily="34" charset="0"/>
+                <a:hlinkClick r:id="rId10"/>
+              </a:rPr>
+              <a:t>Azure AI Document Intelligence</a:t>
+            </a:r>
+            <a:endParaRPr lang="en-US" dirty="0">
+              <a:solidFill>
+                <a:srgbClr val="000000"/>
+              </a:solidFill>
+              <a:highlight>
+                <a:srgbClr val="FFFFFF"/>
+              </a:highlight>
+              <a:latin typeface="Segoe UI" panose="020B0502040204020203" pitchFamily="34" charset="0"/>
+            </a:endParaRPr>
+          </a:p>
+          <a:p>
+            <a:r>
+              <a:rPr lang="en-US" dirty="0">
+                <a:solidFill>
+                  <a:srgbClr val="000000"/>
+                </a:solidFill>
+                <a:highlight>
+                  <a:srgbClr val="FFFFFF"/>
+                </a:highlight>
+                <a:latin typeface="Segoe UI" panose="020B0502040204020203" pitchFamily="34" charset="0"/>
+                <a:hlinkClick r:id="rId11"/>
+              </a:rPr>
+              <a:t>Azure AI Video Indexer</a:t>
+            </a:r>
+            <a:endParaRPr lang="en-US" dirty="0">
+              <a:solidFill>
+                <a:srgbClr val="000000"/>
+              </a:solidFill>
+              <a:highlight>
+                <a:srgbClr val="FFFFFF"/>
+              </a:highlight>
+              <a:latin typeface="Segoe UI" panose="020B0502040204020203" pitchFamily="34" charset="0"/>
+            </a:endParaRPr>
+          </a:p>
+          <a:p>
+            <a:r>
+              <a:rPr lang="en-US" dirty="0">
+                <a:solidFill>
+                  <a:srgbClr val="000000"/>
+                </a:solidFill>
+                <a:highlight>
+                  <a:srgbClr val="FFFFFF"/>
+                </a:highlight>
+                <a:latin typeface="Segoe UI" panose="020B0502040204020203" pitchFamily="34" charset="0"/>
+                <a:hlinkClick r:id="rId12"/>
+              </a:rPr>
+              <a:t>Microsoft Copilot for Security</a:t>
+            </a:r>
+            <a:endParaRPr lang="en-US" dirty="0"/>
           </a:p>
           <a:p>
             <a:endParaRPr lang="en-GB" dirty="0"/>
@@ -4435,14 +4498,18 @@
         </p:nvSpPr>
         <p:spPr/>
         <p:txBody>
-          <a:bodyPr/>
-          <a:lstStyle/>
-          <a:p>
-            <a:r>
-              <a:rPr lang="en-US" dirty="0"/>
-              <a:t>Vision</a:t>
-            </a:r>
-            <a:endParaRPr lang="en-GB" dirty="0"/>
+          <a:bodyPr>
+            <a:normAutofit/>
+          </a:bodyPr>
+          <a:lstStyle/>
+          <a:p>
+            <a:r>
+              <a:rPr lang="en-US" dirty="0">
+                <a:hlinkClick r:id="rId2"/>
+              </a:rPr>
+              <a:t>Azure OpenAI Service</a:t>
+            </a:r>
+            <a:endParaRPr lang="en-US" dirty="0"/>
           </a:p>
         </p:txBody>
       </p:sp>
@@ -4459,75 +4526,39 @@
             <a:spLocks noGrp="1"/>
           </p:cNvSpPr>
           <p:nvPr>
-            <p:ph idx="1"/>
+            <p:ph sz="half" idx="1"/>
           </p:nvPr>
         </p:nvSpPr>
         <p:spPr/>
         <p:txBody>
           <a:bodyPr>
-            <a:normAutofit/>
+            <a:normAutofit fontScale="77500" lnSpcReduction="20000"/>
           </a:bodyPr>
           <a:lstStyle/>
           <a:p>
             <a:r>
               <a:rPr lang="en-US" dirty="0"/>
-              <a:t>Computer v</a:t>
-            </a:r>
-            <a:r>
-              <a:rPr lang="cs-CZ" dirty="0" err="1"/>
-              <a:t>ision</a:t>
-            </a:r>
+              <a:t>Conversational AI</a:t>
+            </a:r>
+          </a:p>
+          <a:p>
             <a:r>
               <a:rPr lang="en-US" dirty="0"/>
-              <a:t> X </a:t>
-            </a:r>
-            <a:r>
-              <a:rPr lang="en-US" dirty="0">
-                <a:hlinkClick r:id="rId2"/>
-              </a:rPr>
-              <a:t>Custom vision</a:t>
-            </a:r>
-            <a:endParaRPr lang="cs-CZ" dirty="0"/>
+              <a:t>Content Creation</a:t>
+            </a:r>
           </a:p>
           <a:p>
             <a:pPr lvl="1"/>
             <a:r>
               <a:rPr lang="en-US" dirty="0"/>
-              <a:t>Image Analysis</a:t>
+              <a:t>GTP-4</a:t>
             </a:r>
           </a:p>
           <a:p>
             <a:pPr lvl="1"/>
             <a:r>
               <a:rPr lang="en-US" dirty="0"/>
-              <a:t>Spatial Analysis</a:t>
-            </a:r>
-          </a:p>
-          <a:p>
-            <a:pPr lvl="1"/>
-            <a:r>
-              <a:rPr lang="en-US" dirty="0"/>
-              <a:t>OCR</a:t>
-            </a:r>
-            <a:endParaRPr lang="cs-CZ" dirty="0"/>
-          </a:p>
-          <a:p>
-            <a:pPr lvl="1"/>
-            <a:r>
-              <a:rPr lang="cs-CZ" dirty="0"/>
-              <a:t>Video </a:t>
-            </a:r>
-            <a:r>
-              <a:rPr lang="cs-CZ" dirty="0" err="1"/>
-              <a:t>Indexer</a:t>
-            </a:r>
-            <a:endParaRPr lang="cs-CZ" dirty="0"/>
-          </a:p>
-          <a:p>
-            <a:pPr lvl="1"/>
-            <a:r>
-              <a:rPr lang="en-US" dirty="0"/>
-              <a:t>Facial Recognition</a:t>
+              <a:t>DALL-E</a:t>
             </a:r>
           </a:p>
           <a:p>
@@ -4541,7 +4572,134 @@
               <a:rPr lang="en-US" dirty="0">
                 <a:hlinkClick r:id="rId3"/>
               </a:rPr>
-              <a:t>Vision studio</a:t>
+              <a:t>OpenAI studio</a:t>
+            </a:r>
+            <a:endParaRPr lang="en-US" dirty="0"/>
+          </a:p>
+        </p:txBody>
+      </p:sp>
+      <p:sp>
+        <p:nvSpPr>
+          <p:cNvPr id="4" name="Content Placeholder 3">
+            <a:extLst>
+              <a:ext uri="{FF2B5EF4-FFF2-40B4-BE49-F238E27FC236}">
+                <a16:creationId xmlns:a16="http://schemas.microsoft.com/office/drawing/2014/main" id="{9EC5018A-3C98-393A-CFC9-0562834C8E38}"/>
+              </a:ext>
+            </a:extLst>
+          </p:cNvPr>
+          <p:cNvSpPr>
+            <a:spLocks noGrp="1"/>
+          </p:cNvSpPr>
+          <p:nvPr>
+            <p:ph sz="half" idx="2"/>
+          </p:nvPr>
+        </p:nvSpPr>
+        <p:spPr/>
+        <p:txBody>
+          <a:bodyPr>
+            <a:normAutofit fontScale="77500" lnSpcReduction="20000"/>
+          </a:bodyPr>
+          <a:lstStyle/>
+          <a:p>
+            <a:r>
+              <a:rPr lang="en-US" dirty="0"/>
+              <a:t>Question / answer API</a:t>
+            </a:r>
+          </a:p>
+          <a:p>
+            <a:r>
+              <a:rPr lang="en-US" dirty="0"/>
+              <a:t>Context can be added</a:t>
+            </a:r>
+          </a:p>
+          <a:p>
+            <a:r>
+              <a:rPr lang="en-US" dirty="0" err="1"/>
+              <a:t>Assistence</a:t>
+            </a:r>
+            <a:r>
+              <a:rPr lang="en-US" dirty="0"/>
+              <a:t> can be added </a:t>
+            </a:r>
+            <a:r>
+              <a:rPr lang="en-US" dirty="0" err="1"/>
+              <a:t>ie</a:t>
+            </a:r>
+            <a:r>
+              <a:rPr lang="en-US" dirty="0"/>
+              <a:t>:</a:t>
+            </a:r>
+          </a:p>
+          <a:p>
+            <a:pPr lvl="1"/>
+            <a:r>
+              <a:rPr lang="en-US" dirty="0"/>
+              <a:t>You are an assistant designed to extract entities from text. Users will paste in a string of text and you will respond with entities you've extracted from the text as a JSON object. Here's an example of your output format:</a:t>
+            </a:r>
+          </a:p>
+          <a:p>
+            <a:pPr marL="457200" lvl="1" indent="0">
+              <a:buNone/>
+            </a:pPr>
+            <a:r>
+              <a:rPr lang="en-US" dirty="0"/>
+              <a:t>{</a:t>
+            </a:r>
+          </a:p>
+          <a:p>
+            <a:pPr marL="457200" lvl="1" indent="0">
+              <a:buNone/>
+            </a:pPr>
+            <a:r>
+              <a:rPr lang="en-US" dirty="0"/>
+              <a:t>	"name": "",</a:t>
+            </a:r>
+          </a:p>
+          <a:p>
+            <a:pPr marL="457200" lvl="1" indent="0">
+              <a:buNone/>
+            </a:pPr>
+            <a:r>
+              <a:rPr lang="en-US" dirty="0"/>
+              <a:t>	"company": "",</a:t>
+            </a:r>
+          </a:p>
+          <a:p>
+            <a:pPr marL="457200" lvl="1" indent="0">
+              <a:buNone/>
+            </a:pPr>
+            <a:r>
+              <a:rPr lang="en-US" dirty="0"/>
+              <a:t>	"</a:t>
+            </a:r>
+            <a:r>
+              <a:rPr lang="en-US" dirty="0" err="1"/>
+              <a:t>phone_number</a:t>
+            </a:r>
+            <a:r>
+              <a:rPr lang="en-US" dirty="0"/>
+              <a:t>": ""</a:t>
+            </a:r>
+          </a:p>
+          <a:p>
+            <a:pPr marL="457200" lvl="1" indent="0">
+              <a:buNone/>
+            </a:pPr>
+            <a:r>
+              <a:rPr lang="en-US" dirty="0"/>
+              <a:t>}</a:t>
+            </a:r>
+          </a:p>
+          <a:p>
+            <a:r>
+              <a:rPr lang="en-US" dirty="0"/>
+              <a:t>Samples: </a:t>
+            </a:r>
+            <a:r>
+              <a:rPr lang="en-US" dirty="0">
+                <a:hlinkClick r:id="rId4"/>
+              </a:rPr>
+              <a:t>https://github.com/Azure/openai-samples</a:t>
             </a:r>
             <a:endParaRPr lang="en-US" dirty="0"/>
           </a:p>
@@ -4557,13 +4715,13 @@
   <p:clrMapOvr>
     <a:masterClrMapping/>
   </p:clrMapOvr>
-  <mc:AlternateContent xmlns:mc="http://schemas.openxmlformats.org/markup-compatibility/2006">
-    <mc:Choice xmlns:p14="http://schemas.microsoft.com/office/powerpoint/2010/main" Requires="p14">
+  <mc:AlternateContent xmlns:mc="http://schemas.openxmlformats.org/markup-compatibility/2006" xmlns:p14="http://schemas.microsoft.com/office/powerpoint/2010/main">
+    <mc:Choice Requires="p14">
       <p:transition spd="med" p14:dur="700">
         <p:fade/>
       </p:transition>
     </mc:Choice>
-    <mc:Fallback>
+    <mc:Fallback xmlns="">
       <p:transition spd="med">
         <p:fade/>
       </p:transition>
@@ -4607,12 +4765,22 @@
         </p:nvSpPr>
         <p:spPr/>
         <p:txBody>
-          <a:bodyPr/>
-          <a:lstStyle/>
-          <a:p>
-            <a:r>
-              <a:rPr lang="en-US" dirty="0"/>
-              <a:t>Speech</a:t>
+          <a:bodyPr>
+            <a:normAutofit/>
+          </a:bodyPr>
+          <a:lstStyle/>
+          <a:p>
+            <a:r>
+              <a:rPr lang="en-US" dirty="0">
+                <a:hlinkClick r:id="rId3"/>
+              </a:rPr>
+              <a:t>Azure AI </a:t>
+            </a:r>
+            <a:r>
+              <a:rPr lang="cs-CZ" dirty="0">
+                <a:hlinkClick r:id="rId3"/>
+              </a:rPr>
+              <a:t>Vision</a:t>
             </a:r>
             <a:endParaRPr lang="en-GB" dirty="0"/>
           </a:p>
@@ -4631,133 +4799,184 @@
             <a:spLocks noGrp="1"/>
           </p:cNvSpPr>
           <p:nvPr>
-            <p:ph idx="1"/>
+            <p:ph sz="half" idx="1"/>
           </p:nvPr>
         </p:nvSpPr>
         <p:spPr/>
         <p:txBody>
           <a:bodyPr>
-            <a:normAutofit/>
+            <a:normAutofit fontScale="92500" lnSpcReduction="20000"/>
           </a:bodyPr>
           <a:lstStyle/>
           <a:p>
             <a:r>
-              <a:rPr lang="cs-CZ" dirty="0" err="1"/>
-              <a:t>Speech</a:t>
+              <a:rPr lang="en-US" dirty="0"/>
+              <a:t>Computer vision X </a:t>
+            </a:r>
+            <a:r>
+              <a:rPr lang="en-US" dirty="0">
+                <a:hlinkClick r:id="rId4"/>
+              </a:rPr>
+              <a:t>Custom vision</a:t>
             </a:r>
             <a:endParaRPr lang="cs-CZ" dirty="0"/>
           </a:p>
           <a:p>
             <a:pPr lvl="1"/>
             <a:r>
-              <a:rPr lang="cs-CZ" dirty="0" err="1"/>
-              <a:t>Speech</a:t>
-            </a:r>
+              <a:rPr lang="en-US" dirty="0"/>
+              <a:t>Image Analysis</a:t>
+            </a:r>
+          </a:p>
+          <a:p>
+            <a:pPr lvl="1"/>
+            <a:r>
+              <a:rPr lang="en-US" dirty="0"/>
+              <a:t>Spatial Analysis</a:t>
+            </a:r>
+          </a:p>
+          <a:p>
+            <a:pPr lvl="1"/>
+            <a:r>
+              <a:rPr lang="en-US" dirty="0"/>
+              <a:t>Search content of photos</a:t>
+            </a:r>
+          </a:p>
+          <a:p>
+            <a:pPr lvl="1"/>
+            <a:r>
+              <a:rPr lang="en-US" dirty="0"/>
+              <a:t>OCR</a:t>
+            </a:r>
+          </a:p>
+          <a:p>
+            <a:pPr lvl="1"/>
+            <a:r>
+              <a:rPr lang="en-US" dirty="0"/>
+              <a:t>Add captions</a:t>
+            </a:r>
+          </a:p>
+          <a:p>
+            <a:pPr lvl="1"/>
+            <a:r>
+              <a:rPr lang="en-US" dirty="0"/>
+              <a:t>Remove backgrounds</a:t>
+            </a:r>
+            <a:endParaRPr lang="cs-CZ" dirty="0"/>
+          </a:p>
+          <a:p>
+            <a:pPr lvl="1"/>
             <a:r>
               <a:rPr lang="cs-CZ" dirty="0"/>
-              <a:t> to </a:t>
-            </a:r>
+              <a:t>Video Indexer</a:t>
+            </a:r>
+            <a:endParaRPr lang="en-US" dirty="0"/>
+          </a:p>
+          <a:p>
+            <a:pPr lvl="1"/>
             <a:r>
               <a:rPr lang="en-US" dirty="0"/>
-              <a:t>t</a:t>
-            </a:r>
-            <a:r>
-              <a:rPr lang="cs-CZ" dirty="0" err="1"/>
-              <a:t>ext</a:t>
+              <a:t>Objects tagging</a:t>
+            </a:r>
+          </a:p>
+          <a:p>
+            <a:pPr lvl="1"/>
+            <a:r>
+              <a:rPr lang="en-US" dirty="0"/>
+              <a:t>Smart crop</a:t>
             </a:r>
             <a:endParaRPr lang="cs-CZ" dirty="0"/>
           </a:p>
           <a:p>
             <a:pPr lvl="1"/>
             <a:r>
-              <a:rPr lang="cs-CZ" dirty="0"/>
-              <a:t>Text to </a:t>
-            </a:r>
-            <a:r>
               <a:rPr lang="en-US" dirty="0"/>
-              <a:t>s</a:t>
-            </a:r>
-            <a:r>
-              <a:rPr lang="cs-CZ" dirty="0" err="1"/>
-              <a:t>peech</a:t>
-            </a:r>
-            <a:endParaRPr lang="cs-CZ" dirty="0"/>
-          </a:p>
-          <a:p>
-            <a:pPr lvl="1"/>
-            <a:r>
-              <a:rPr lang="cs-CZ" dirty="0" err="1"/>
-              <a:t>Speech</a:t>
-            </a:r>
-            <a:r>
-              <a:rPr lang="cs-CZ" dirty="0"/>
-              <a:t> </a:t>
-            </a:r>
-            <a:r>
-              <a:rPr lang="en-US" dirty="0"/>
-              <a:t>t</a:t>
-            </a:r>
-            <a:r>
-              <a:rPr lang="cs-CZ" dirty="0" err="1"/>
-              <a:t>ranslation</a:t>
-            </a:r>
-            <a:endParaRPr lang="cs-CZ" dirty="0"/>
-          </a:p>
-          <a:p>
-            <a:pPr lvl="1"/>
-            <a:r>
-              <a:rPr lang="cs-CZ" dirty="0" err="1"/>
-              <a:t>Speaker</a:t>
-            </a:r>
-            <a:r>
-              <a:rPr lang="cs-CZ" dirty="0"/>
-              <a:t> </a:t>
-            </a:r>
-            <a:r>
-              <a:rPr lang="en-US" dirty="0"/>
-              <a:t>r</a:t>
-            </a:r>
-            <a:r>
-              <a:rPr lang="cs-CZ" dirty="0" err="1"/>
-              <a:t>ecognition</a:t>
-            </a:r>
+              <a:t>Facial Recognition</a:t>
+            </a:r>
+          </a:p>
+          <a:p>
+            <a:pPr marL="457200" lvl="1" indent="0">
+              <a:buNone/>
+            </a:pPr>
             <a:endParaRPr lang="en-US" dirty="0"/>
           </a:p>
           <a:p>
-            <a:pPr lvl="1"/>
+            <a:r>
+              <a:rPr lang="en-US" dirty="0">
+                <a:hlinkClick r:id="rId5"/>
+              </a:rPr>
+              <a:t>Vision studio</a:t>
+            </a:r>
             <a:endParaRPr lang="en-US" dirty="0"/>
           </a:p>
-          <a:p>
-            <a:r>
-              <a:rPr lang="en-US" dirty="0">
-                <a:hlinkClick r:id="rId2"/>
-              </a:rPr>
-              <a:t>Speech studio</a:t>
-            </a:r>
-            <a:endParaRPr lang="cs-CZ" dirty="0"/>
-          </a:p>
-          <a:p>
-            <a:endParaRPr lang="en-GB" dirty="0"/>
-          </a:p>
-        </p:txBody>
-      </p:sp>
+        </p:txBody>
+      </p:sp>
+      <p:pic>
+        <p:nvPicPr>
+          <p:cNvPr id="1026" name="Picture 2" descr="A face diagram with all 27 landmarks labeled">
+            <a:extLst>
+              <a:ext uri="{FF2B5EF4-FFF2-40B4-BE49-F238E27FC236}">
+                <a16:creationId xmlns:a16="http://schemas.microsoft.com/office/drawing/2014/main" id="{E2C9EE33-C461-010D-7E16-8BD1B97DB7F4}"/>
+              </a:ext>
+            </a:extLst>
+          </p:cNvPr>
+          <p:cNvPicPr>
+            <a:picLocks noGrp="1" noChangeAspect="1" noChangeArrowheads="1"/>
+          </p:cNvPicPr>
+          <p:nvPr>
+            <p:ph sz="half" idx="2"/>
+          </p:nvPr>
+        </p:nvPicPr>
+        <p:blipFill>
+          <a:blip r:embed="rId6">
+            <a:extLst>
+              <a:ext uri="{28A0092B-C50C-407E-A947-70E740481C1C}">
+                <a14:useLocalDpi xmlns:a14="http://schemas.microsoft.com/office/drawing/2010/main" val="0"/>
+              </a:ext>
+            </a:extLst>
+          </a:blip>
+          <a:srcRect/>
+          <a:stretch>
+            <a:fillRect/>
+          </a:stretch>
+        </p:blipFill>
+        <p:spPr bwMode="auto">
+          <a:xfrm>
+            <a:off x="6197600" y="2077295"/>
+            <a:ext cx="5384800" cy="3571772"/>
+          </a:xfrm>
+          <a:prstGeom prst="rect">
+            <a:avLst/>
+          </a:prstGeom>
+          <a:noFill/>
+          <a:extLst>
+            <a:ext uri="{909E8E84-426E-40DD-AFC4-6F175D3DCCD1}">
+              <a14:hiddenFill xmlns:a14="http://schemas.microsoft.com/office/drawing/2010/main">
+                <a:solidFill>
+                  <a:srgbClr val="FFFFFF"/>
+                </a:solidFill>
+              </a14:hiddenFill>
+            </a:ext>
+          </a:extLst>
+        </p:spPr>
+      </p:pic>
     </p:spTree>
     <p:extLst>
       <p:ext uri="{BB962C8B-B14F-4D97-AF65-F5344CB8AC3E}">
-        <p14:creationId xmlns:p14="http://schemas.microsoft.com/office/powerpoint/2010/main" val="2119900680"/>
+        <p14:creationId xmlns:p14="http://schemas.microsoft.com/office/powerpoint/2010/main" val="3634389014"/>
       </p:ext>
     </p:extLst>
   </p:cSld>
   <p:clrMapOvr>
     <a:masterClrMapping/>
   </p:clrMapOvr>
-  <mc:AlternateContent xmlns:mc="http://schemas.openxmlformats.org/markup-compatibility/2006">
-    <mc:Choice xmlns:p14="http://schemas.microsoft.com/office/powerpoint/2010/main" Requires="p14">
+  <mc:AlternateContent xmlns:mc="http://schemas.openxmlformats.org/markup-compatibility/2006" xmlns:p14="http://schemas.microsoft.com/office/powerpoint/2010/main">
+    <mc:Choice Requires="p14">
       <p:transition spd="med" p14:dur="700">
         <p:fade/>
       </p:transition>
     </mc:Choice>
-    <mc:Fallback>
+    <mc:Fallback xmlns="">
       <p:transition spd="med">
         <p:fade/>
       </p:transition>
@@ -4801,12 +5020,22 @@
         </p:nvSpPr>
         <p:spPr/>
         <p:txBody>
-          <a:bodyPr/>
-          <a:lstStyle/>
-          <a:p>
-            <a:r>
-              <a:rPr lang="en-US" dirty="0"/>
-              <a:t>Language</a:t>
+          <a:bodyPr>
+            <a:normAutofit/>
+          </a:bodyPr>
+          <a:lstStyle/>
+          <a:p>
+            <a:r>
+              <a:rPr lang="en-US" dirty="0">
+                <a:hlinkClick r:id="rId2"/>
+              </a:rPr>
+              <a:t>Azure AI </a:t>
+            </a:r>
+            <a:r>
+              <a:rPr lang="cs-CZ" dirty="0">
+                <a:hlinkClick r:id="rId2"/>
+              </a:rPr>
+              <a:t>Speech</a:t>
             </a:r>
             <a:endParaRPr lang="en-GB" dirty="0"/>
           </a:p>
@@ -4831,54 +5060,94 @@
         <p:spPr/>
         <p:txBody>
           <a:bodyPr>
-            <a:normAutofit/>
+            <a:normAutofit fontScale="92500" lnSpcReduction="10000"/>
           </a:bodyPr>
           <a:lstStyle/>
           <a:p>
             <a:r>
+              <a:rPr lang="cs-CZ" dirty="0"/>
+              <a:t>Speech to </a:t>
+            </a:r>
+            <a:r>
               <a:rPr lang="en-US" dirty="0"/>
-              <a:t>Text classification</a:t>
-            </a:r>
-          </a:p>
-          <a:p>
-            <a:pPr lvl="1"/>
+              <a:t>t</a:t>
+            </a:r>
+            <a:r>
+              <a:rPr lang="cs-CZ" dirty="0" err="1"/>
+              <a:t>ext</a:t>
+            </a:r>
+            <a:endParaRPr lang="cs-CZ" dirty="0"/>
+          </a:p>
+          <a:p>
+            <a:r>
+              <a:rPr lang="cs-CZ" dirty="0"/>
+              <a:t>Text to </a:t>
+            </a:r>
             <a:r>
               <a:rPr lang="en-US" dirty="0"/>
-              <a:t>Analyze sentiment</a:t>
-            </a:r>
-          </a:p>
-          <a:p>
-            <a:pPr lvl="1"/>
+              <a:t>s</a:t>
+            </a:r>
+            <a:r>
+              <a:rPr lang="cs-CZ" dirty="0" err="1"/>
+              <a:t>peech</a:t>
+            </a:r>
+            <a:endParaRPr lang="cs-CZ" dirty="0"/>
+          </a:p>
+          <a:p>
+            <a:r>
+              <a:rPr lang="cs-CZ" dirty="0" err="1"/>
+              <a:t>Speech</a:t>
+            </a:r>
+            <a:r>
+              <a:rPr lang="cs-CZ" dirty="0"/>
+              <a:t> </a:t>
+            </a:r>
             <a:r>
               <a:rPr lang="en-US" dirty="0"/>
-              <a:t>Detect language</a:t>
-            </a:r>
-          </a:p>
-          <a:p>
-            <a:pPr lvl="1"/>
+              <a:t>t</a:t>
+            </a:r>
+            <a:r>
+              <a:rPr lang="cs-CZ" dirty="0"/>
+              <a:t>ranslation</a:t>
+            </a:r>
+          </a:p>
+          <a:p>
+            <a:r>
+              <a:rPr lang="cs-CZ" dirty="0"/>
+              <a:t>Speaker </a:t>
+            </a:r>
             <a:r>
               <a:rPr lang="en-US" dirty="0"/>
-              <a:t>Custom text classification</a:t>
-            </a:r>
+              <a:t>verification and r</a:t>
+            </a:r>
+            <a:r>
+              <a:rPr lang="cs-CZ" dirty="0"/>
+              <a:t>ecognition</a:t>
+            </a:r>
+            <a:endParaRPr lang="en-US" dirty="0"/>
           </a:p>
           <a:p>
             <a:r>
               <a:rPr lang="en-US" dirty="0"/>
-              <a:t>Understand conversations</a:t>
-            </a:r>
-          </a:p>
-          <a:p>
-            <a:pPr lvl="1"/>
+              <a:t>Captioning</a:t>
+            </a:r>
+          </a:p>
+          <a:p>
             <a:r>
               <a:rPr lang="en-US" dirty="0"/>
-              <a:t>Question answering</a:t>
-            </a:r>
-          </a:p>
-          <a:p>
-            <a:pPr lvl="1"/>
+              <a:t>Post call transcription and analysis</a:t>
+            </a:r>
+          </a:p>
+          <a:p>
             <a:r>
               <a:rPr lang="en-US" dirty="0"/>
-              <a:t>Conversation understanding</a:t>
+              <a:t>Live speech avatar</a:t>
+            </a:r>
+          </a:p>
+          <a:p>
+            <a:r>
+              <a:rPr lang="en-US" dirty="0"/>
+              <a:t>Custom voice / personal voice</a:t>
             </a:r>
           </a:p>
           <a:p>
@@ -4888,31 +5157,34 @@
           <a:p>
             <a:r>
               <a:rPr lang="en-US" dirty="0">
-                <a:hlinkClick r:id="rId2"/>
+                <a:hlinkClick r:id="rId3"/>
               </a:rPr>
-              <a:t>Language studio</a:t>
-            </a:r>
-            <a:endParaRPr lang="en-US" dirty="0"/>
+              <a:t>Speech studio</a:t>
+            </a:r>
+            <a:endParaRPr lang="cs-CZ" dirty="0"/>
+          </a:p>
+          <a:p>
+            <a:endParaRPr lang="en-GB" dirty="0"/>
           </a:p>
         </p:txBody>
       </p:sp>
     </p:spTree>
     <p:extLst>
       <p:ext uri="{BB962C8B-B14F-4D97-AF65-F5344CB8AC3E}">
-        <p14:creationId xmlns:p14="http://schemas.microsoft.com/office/powerpoint/2010/main" val="2636116476"/>
+        <p14:creationId xmlns:p14="http://schemas.microsoft.com/office/powerpoint/2010/main" val="2119900680"/>
       </p:ext>
     </p:extLst>
   </p:cSld>
   <p:clrMapOvr>
     <a:masterClrMapping/>
   </p:clrMapOvr>
-  <mc:AlternateContent xmlns:mc="http://schemas.openxmlformats.org/markup-compatibility/2006">
-    <mc:Choice xmlns:p14="http://schemas.microsoft.com/office/powerpoint/2010/main" Requires="p14">
+  <mc:AlternateContent xmlns:mc="http://schemas.openxmlformats.org/markup-compatibility/2006" xmlns:p14="http://schemas.microsoft.com/office/powerpoint/2010/main">
+    <mc:Choice Requires="p14">
       <p:transition spd="med" p14:dur="700">
         <p:fade/>
       </p:transition>
     </mc:Choice>
-    <mc:Fallback>
+    <mc:Fallback xmlns="">
       <p:transition spd="med">
         <p:fade/>
       </p:transition>
@@ -4956,12 +5228,16 @@
         </p:nvSpPr>
         <p:spPr/>
         <p:txBody>
-          <a:bodyPr/>
-          <a:lstStyle/>
-          <a:p>
-            <a:r>
-              <a:rPr lang="en-US" dirty="0"/>
-              <a:t>Decision</a:t>
+          <a:bodyPr>
+            <a:normAutofit/>
+          </a:bodyPr>
+          <a:lstStyle/>
+          <a:p>
+            <a:r>
+              <a:rPr lang="en-US" dirty="0">
+                <a:hlinkClick r:id="rId2"/>
+              </a:rPr>
+              <a:t>Azure AI Language</a:t>
             </a:r>
             <a:endParaRPr lang="en-GB" dirty="0"/>
           </a:p>
@@ -4986,46 +5262,102 @@
         <p:spPr/>
         <p:txBody>
           <a:bodyPr>
-            <a:normAutofit/>
+            <a:normAutofit fontScale="92500" lnSpcReduction="10000"/>
           </a:bodyPr>
           <a:lstStyle/>
           <a:p>
             <a:r>
               <a:rPr lang="en-US" dirty="0"/>
-              <a:t>Anomaly detection</a:t>
-            </a:r>
-          </a:p>
-          <a:p>
+              <a:t>Text classification</a:t>
+            </a:r>
+          </a:p>
+          <a:p>
+            <a:pPr lvl="1"/>
             <a:r>
               <a:rPr lang="en-US" dirty="0"/>
-              <a:t>Content moderator</a:t>
-            </a:r>
-          </a:p>
-          <a:p>
+              <a:t>Analyze sentiment</a:t>
+            </a:r>
+          </a:p>
+          <a:p>
+            <a:pPr lvl="1"/>
             <a:r>
               <a:rPr lang="en-US" dirty="0"/>
-              <a:t>Personalizer</a:t>
-            </a:r>
+              <a:t>Detect language</a:t>
+            </a:r>
+          </a:p>
+          <a:p>
+            <a:pPr lvl="1"/>
+            <a:r>
+              <a:rPr lang="en-US" dirty="0"/>
+              <a:t>Custom text classification</a:t>
+            </a:r>
+          </a:p>
+          <a:p>
+            <a:pPr lvl="1"/>
+            <a:r>
+              <a:rPr lang="en-US" dirty="0"/>
+              <a:t>Structural information extraction</a:t>
+            </a:r>
+          </a:p>
+          <a:p>
+            <a:pPr lvl="1"/>
+            <a:r>
+              <a:rPr lang="en-US" dirty="0"/>
+              <a:t>Text summarization</a:t>
+            </a:r>
+          </a:p>
+          <a:p>
+            <a:r>
+              <a:rPr lang="en-US" dirty="0"/>
+              <a:t>Understand conversations</a:t>
+            </a:r>
+          </a:p>
+          <a:p>
+            <a:pPr lvl="1"/>
+            <a:r>
+              <a:rPr lang="en-US" dirty="0"/>
+              <a:t>Question answering</a:t>
+            </a:r>
+          </a:p>
+          <a:p>
+            <a:pPr lvl="1"/>
+            <a:r>
+              <a:rPr lang="en-US" dirty="0"/>
+              <a:t>Conversation understanding</a:t>
+            </a:r>
+          </a:p>
+          <a:p>
+            <a:pPr lvl="1"/>
+            <a:endParaRPr lang="en-US" dirty="0"/>
+          </a:p>
+          <a:p>
+            <a:r>
+              <a:rPr lang="en-US" dirty="0">
+                <a:hlinkClick r:id="rId3"/>
+              </a:rPr>
+              <a:t>Language studio</a:t>
+            </a:r>
+            <a:endParaRPr lang="en-US" dirty="0"/>
           </a:p>
         </p:txBody>
       </p:sp>
     </p:spTree>
     <p:extLst>
       <p:ext uri="{BB962C8B-B14F-4D97-AF65-F5344CB8AC3E}">
-        <p14:creationId xmlns:p14="http://schemas.microsoft.com/office/powerpoint/2010/main" val="4276753214"/>
+        <p14:creationId xmlns:p14="http://schemas.microsoft.com/office/powerpoint/2010/main" val="2636116476"/>
       </p:ext>
     </p:extLst>
   </p:cSld>
   <p:clrMapOvr>
     <a:masterClrMapping/>
   </p:clrMapOvr>
-  <mc:AlternateContent xmlns:mc="http://schemas.openxmlformats.org/markup-compatibility/2006">
-    <mc:Choice xmlns:p14="http://schemas.microsoft.com/office/powerpoint/2010/main" Requires="p14">
+  <mc:AlternateContent xmlns:mc="http://schemas.openxmlformats.org/markup-compatibility/2006" xmlns:p14="http://schemas.microsoft.com/office/powerpoint/2010/main">
+    <mc:Choice Requires="p14">
       <p:transition spd="med" p14:dur="700">
         <p:fade/>
       </p:transition>
     </mc:Choice>
-    <mc:Fallback>
+    <mc:Fallback xmlns="">
       <p:transition spd="med">
         <p:fade/>
       </p:transition>
@@ -5069,14 +5401,18 @@
         </p:nvSpPr>
         <p:spPr/>
         <p:txBody>
-          <a:bodyPr/>
-          <a:lstStyle/>
-          <a:p>
-            <a:r>
-              <a:rPr lang="en-US" dirty="0"/>
-              <a:t>OpenAI Service</a:t>
-            </a:r>
-            <a:endParaRPr lang="en-GB" dirty="0"/>
+          <a:bodyPr>
+            <a:normAutofit/>
+          </a:bodyPr>
+          <a:lstStyle/>
+          <a:p>
+            <a:r>
+              <a:rPr lang="en-US" dirty="0">
+                <a:hlinkClick r:id="rId2"/>
+              </a:rPr>
+              <a:t>Azure AI Content Safety</a:t>
+            </a:r>
+            <a:endParaRPr lang="en-US" dirty="0"/>
           </a:p>
         </p:txBody>
       </p:sp>
@@ -5099,110 +5435,56 @@
         <p:spPr/>
         <p:txBody>
           <a:bodyPr>
-            <a:normAutofit fontScale="92500" lnSpcReduction="20000"/>
+            <a:normAutofit/>
           </a:bodyPr>
           <a:lstStyle/>
           <a:p>
             <a:r>
-              <a:rPr lang="en-US" dirty="0"/>
-              <a:t>Question / answer API</a:t>
-            </a:r>
-          </a:p>
-          <a:p>
-            <a:r>
-              <a:rPr lang="en-US" dirty="0"/>
-              <a:t>Context can be added</a:t>
-            </a:r>
-          </a:p>
-          <a:p>
-            <a:r>
-              <a:rPr lang="en-US" dirty="0" err="1"/>
-              <a:t>Assistence</a:t>
-            </a:r>
-            <a:r>
-              <a:rPr lang="en-US" dirty="0"/>
-              <a:t> can be added </a:t>
-            </a:r>
-            <a:r>
-              <a:rPr lang="en-US" dirty="0" err="1"/>
-              <a:t>ie</a:t>
-            </a:r>
-            <a:r>
-              <a:rPr lang="en-US" dirty="0"/>
-              <a:t>:</a:t>
+              <a:rPr lang="en-US" b="0" i="0" dirty="0">
+                <a:solidFill>
+                  <a:srgbClr val="000000"/>
+                </a:solidFill>
+                <a:effectLst/>
+                <a:highlight>
+                  <a:srgbClr val="FFFFFF"/>
+                </a:highlight>
+                <a:latin typeface="Segoe UI" panose="020B0502040204020203" pitchFamily="34" charset="0"/>
+              </a:rPr>
+              <a:t>Detect and filter violence, hate, sexual and self-harm content</a:t>
+            </a:r>
+          </a:p>
+          <a:p>
+            <a:r>
+              <a:rPr lang="en-US" b="0" i="0" dirty="0">
+                <a:solidFill>
+                  <a:srgbClr val="000000"/>
+                </a:solidFill>
+                <a:effectLst/>
+                <a:highlight>
+                  <a:srgbClr val="FFFFFF"/>
+                </a:highlight>
+                <a:latin typeface="Segoe UI" panose="020B0502040204020203" pitchFamily="34" charset="0"/>
+              </a:rPr>
+              <a:t>Monitor text, images, and multimodal content</a:t>
+            </a:r>
+          </a:p>
+          <a:p>
+            <a:r>
+              <a:rPr lang="en-US" b="0" i="0" dirty="0">
+                <a:solidFill>
+                  <a:srgbClr val="000000"/>
+                </a:solidFill>
+                <a:effectLst/>
+                <a:highlight>
+                  <a:srgbClr val="FFFFFF"/>
+                </a:highlight>
+                <a:latin typeface="Segoe UI" panose="020B0502040204020203" pitchFamily="34" charset="0"/>
+              </a:rPr>
+              <a:t>Analyze human and AI-generated content</a:t>
             </a:r>
           </a:p>
           <a:p>
             <a:pPr lvl="1"/>
-            <a:r>
-              <a:rPr lang="en-US" dirty="0"/>
-              <a:t>You are an assistant designed to extract entities from text. Users will paste in a string of text and you will respond with entities you've extracted from the text as a JSON object. Here's an example of your output format:</a:t>
-            </a:r>
-          </a:p>
-          <a:p>
-            <a:pPr marL="457200" lvl="1" indent="0">
-              <a:buNone/>
-            </a:pPr>
-            <a:r>
-              <a:rPr lang="en-US" dirty="0"/>
-              <a:t>{</a:t>
-            </a:r>
-          </a:p>
-          <a:p>
-            <a:pPr marL="457200" lvl="1" indent="0">
-              <a:buNone/>
-            </a:pPr>
-            <a:r>
-              <a:rPr lang="en-US" dirty="0"/>
-              <a:t>	"name": "",</a:t>
-            </a:r>
-          </a:p>
-          <a:p>
-            <a:pPr marL="457200" lvl="1" indent="0">
-              <a:buNone/>
-            </a:pPr>
-            <a:r>
-              <a:rPr lang="en-US" dirty="0"/>
-              <a:t>	"company": "",</a:t>
-            </a:r>
-          </a:p>
-          <a:p>
-            <a:pPr marL="457200" lvl="1" indent="0">
-              <a:buNone/>
-            </a:pPr>
-            <a:r>
-              <a:rPr lang="en-US" dirty="0"/>
-              <a:t>	"</a:t>
-            </a:r>
-            <a:r>
-              <a:rPr lang="en-US" dirty="0" err="1"/>
-              <a:t>phone_number</a:t>
-            </a:r>
-            <a:r>
-              <a:rPr lang="en-US" dirty="0"/>
-              <a:t>": ""</a:t>
-            </a:r>
-          </a:p>
-          <a:p>
-            <a:pPr marL="457200" lvl="1" indent="0">
-              <a:buNone/>
-            </a:pPr>
-            <a:r>
-              <a:rPr lang="en-US" dirty="0"/>
-              <a:t>}</a:t>
-            </a:r>
-          </a:p>
-          <a:p>
-            <a:r>
-              <a:rPr lang="en-US" dirty="0"/>
-              <a:t>Samples: </a:t>
-            </a:r>
-            <a:r>
-              <a:rPr lang="en-US" dirty="0">
-                <a:hlinkClick r:id="rId2"/>
-              </a:rPr>
-              <a:t>https://github.com/Azure/openai-samples</a:t>
-            </a:r>
             <a:endParaRPr lang="en-US" dirty="0"/>
           </a:p>
           <a:p>
@@ -5210,14 +5492,8 @@
               <a:rPr lang="en-US" dirty="0">
                 <a:hlinkClick r:id="rId3"/>
               </a:rPr>
-              <a:t>OpenAI studio</a:t>
-            </a:r>
-            <a:endParaRPr lang="en-US" dirty="0"/>
-          </a:p>
-          <a:p>
-            <a:endParaRPr lang="en-US" dirty="0"/>
-          </a:p>
-          <a:p>
+              <a:t>Content safety studio</a:t>
+            </a:r>
             <a:endParaRPr lang="en-US" dirty="0"/>
           </a:p>
         </p:txBody>
@@ -5225,20 +5501,20 @@
     </p:spTree>
     <p:extLst>
       <p:ext uri="{BB962C8B-B14F-4D97-AF65-F5344CB8AC3E}">
-        <p14:creationId xmlns:p14="http://schemas.microsoft.com/office/powerpoint/2010/main" val="937419884"/>
+        <p14:creationId xmlns:p14="http://schemas.microsoft.com/office/powerpoint/2010/main" val="4209733990"/>
       </p:ext>
     </p:extLst>
   </p:cSld>
   <p:clrMapOvr>
     <a:masterClrMapping/>
   </p:clrMapOvr>
-  <mc:AlternateContent xmlns:mc="http://schemas.openxmlformats.org/markup-compatibility/2006">
-    <mc:Choice xmlns:p14="http://schemas.microsoft.com/office/powerpoint/2010/main" Requires="p14">
+  <mc:AlternateContent xmlns:mc="http://schemas.openxmlformats.org/markup-compatibility/2006" xmlns:p14="http://schemas.microsoft.com/office/powerpoint/2010/main">
+    <mc:Choice Requires="p14">
       <p:transition spd="med" p14:dur="700">
         <p:fade/>
       </p:transition>
     </mc:Choice>
-    <mc:Fallback>
+    <mc:Fallback xmlns="">
       <p:transition spd="med">
         <p:fade/>
       </p:transition>
@@ -5248,6 +5524,143 @@
 </file>
 
 <file path=ppt/slides/slide8.xml><?xml version="1.0" encoding="utf-8"?>
+<p:sld xmlns:a="http://schemas.openxmlformats.org/drawingml/2006/main" xmlns:r="http://schemas.openxmlformats.org/officeDocument/2006/relationships" xmlns:p="http://schemas.openxmlformats.org/presentationml/2006/main">
+  <p:cSld>
+    <p:spTree>
+      <p:nvGrpSpPr>
+        <p:cNvPr id="1" name=""/>
+        <p:cNvGrpSpPr/>
+        <p:nvPr/>
+      </p:nvGrpSpPr>
+      <p:grpSpPr>
+        <a:xfrm>
+          <a:off x="0" y="0"/>
+          <a:ext cx="0" cy="0"/>
+          <a:chOff x="0" y="0"/>
+          <a:chExt cx="0" cy="0"/>
+        </a:xfrm>
+      </p:grpSpPr>
+      <p:sp>
+        <p:nvSpPr>
+          <p:cNvPr id="2" name="Nadpis 1">
+            <a:extLst>
+              <a:ext uri="{FF2B5EF4-FFF2-40B4-BE49-F238E27FC236}">
+                <a16:creationId xmlns:a16="http://schemas.microsoft.com/office/drawing/2014/main" id="{B9570988-CFE2-4DB9-8B6B-DB25AB44AFFD}"/>
+              </a:ext>
+            </a:extLst>
+          </p:cNvPr>
+          <p:cNvSpPr>
+            <a:spLocks noGrp="1"/>
+          </p:cNvSpPr>
+          <p:nvPr>
+            <p:ph type="title"/>
+          </p:nvPr>
+        </p:nvSpPr>
+        <p:spPr/>
+        <p:txBody>
+          <a:bodyPr>
+            <a:normAutofit/>
+          </a:bodyPr>
+          <a:lstStyle/>
+          <a:p>
+            <a:r>
+              <a:rPr lang="en-US" dirty="0">
+                <a:hlinkClick r:id="rId2"/>
+              </a:rPr>
+              <a:t>Azure AI Document Intelligence</a:t>
+            </a:r>
+            <a:endParaRPr lang="en-US" dirty="0"/>
+          </a:p>
+        </p:txBody>
+      </p:sp>
+      <p:sp>
+        <p:nvSpPr>
+          <p:cNvPr id="3" name="Zástupný obsah 2">
+            <a:extLst>
+              <a:ext uri="{FF2B5EF4-FFF2-40B4-BE49-F238E27FC236}">
+                <a16:creationId xmlns:a16="http://schemas.microsoft.com/office/drawing/2014/main" id="{7924E817-B109-4581-A8C5-1CC4EA99D951}"/>
+              </a:ext>
+            </a:extLst>
+          </p:cNvPr>
+          <p:cNvSpPr>
+            <a:spLocks noGrp="1"/>
+          </p:cNvSpPr>
+          <p:nvPr>
+            <p:ph idx="1"/>
+          </p:nvPr>
+        </p:nvSpPr>
+        <p:spPr/>
+        <p:txBody>
+          <a:bodyPr>
+            <a:normAutofit/>
+          </a:bodyPr>
+          <a:lstStyle/>
+          <a:p>
+            <a:r>
+              <a:rPr lang="en-US" dirty="0"/>
+              <a:t>Document Analysis and extraction</a:t>
+            </a:r>
+          </a:p>
+          <a:p>
+            <a:r>
+              <a:rPr lang="en-US" dirty="0"/>
+              <a:t>OCR</a:t>
+            </a:r>
+          </a:p>
+          <a:p>
+            <a:r>
+              <a:rPr lang="en-US" dirty="0"/>
+              <a:t>Layout detection</a:t>
+            </a:r>
+          </a:p>
+          <a:p>
+            <a:r>
+              <a:rPr lang="en-US" dirty="0"/>
+              <a:t>Extraction with custom / prebuilt model</a:t>
+            </a:r>
+          </a:p>
+          <a:p>
+            <a:endParaRPr lang="en-US" dirty="0">
+              <a:hlinkClick r:id="rId3"/>
+            </a:endParaRPr>
+          </a:p>
+          <a:p>
+            <a:r>
+              <a:rPr lang="en-US" dirty="0">
+                <a:hlinkClick r:id="rId3"/>
+              </a:rPr>
+              <a:t>Document Intelligence Studio</a:t>
+            </a:r>
+            <a:endParaRPr lang="en-US" dirty="0"/>
+          </a:p>
+        </p:txBody>
+      </p:sp>
+    </p:spTree>
+    <p:extLst>
+      <p:ext uri="{BB962C8B-B14F-4D97-AF65-F5344CB8AC3E}">
+        <p14:creationId xmlns:p14="http://schemas.microsoft.com/office/powerpoint/2010/main" val="2463135045"/>
+      </p:ext>
+    </p:extLst>
+  </p:cSld>
+  <p:clrMapOvr>
+    <a:masterClrMapping/>
+  </p:clrMapOvr>
+  <mc:AlternateContent xmlns:mc="http://schemas.openxmlformats.org/markup-compatibility/2006" xmlns:p14="http://schemas.microsoft.com/office/powerpoint/2010/main">
+    <mc:Choice Requires="p14">
+      <p:transition spd="med" p14:dur="700">
+        <p:fade/>
+      </p:transition>
+    </mc:Choice>
+    <mc:Fallback xmlns="">
+      <p:transition spd="med">
+        <p:fade/>
+      </p:transition>
+    </mc:Fallback>
+  </mc:AlternateContent>
+</p:sld>
+</file>
+
+<file path=ppt/slides/slide9.xml><?xml version="1.0" encoding="utf-8"?>
 <p:sld xmlns:a="http://schemas.openxmlformats.org/drawingml/2006/main" xmlns:r="http://schemas.openxmlformats.org/officeDocument/2006/relationships" xmlns:p="http://schemas.openxmlformats.org/presentationml/2006/main">
   <p:cSld>
     <p:spTree>

</xml_diff>

<commit_message>
Lab 8 - Cognitive Services update
</commit_message>
<xml_diff>
--- a/Lab8-CognitiveServices/Cognitive-services.pptx
+++ b/Lab8-CognitiveServices/Cognitive-services.pptx
@@ -247,7 +247,7 @@
             <a:fld id="{A74C3DD1-6B4C-423E-A696-BD4124EC33BC}" type="datetimeFigureOut">
               <a:rPr lang="cs-CZ" smtClean="0"/>
               <a:pPr/>
-              <a:t>09.04.2024</a:t>
+              <a:t>27.03.2025</a:t>
             </a:fld>
             <a:endParaRPr lang="cs-CZ" dirty="0"/>
           </a:p>
@@ -888,7 +888,7 @@
           <a:p>
             <a:fld id="{0DA6F2F8-F70A-47D7-AD2D-4F12E71A0C18}" type="datetimeFigureOut">
               <a:rPr lang="cs-CZ" smtClean="0"/>
-              <a:t>09.04.2024</a:t>
+              <a:t>27.03.2025</a:t>
             </a:fld>
             <a:endParaRPr lang="cs-CZ"/>
           </a:p>
@@ -1069,7 +1069,7 @@
           <a:p>
             <a:fld id="{0DA6F2F8-F70A-47D7-AD2D-4F12E71A0C18}" type="datetimeFigureOut">
               <a:rPr lang="cs-CZ" smtClean="0"/>
-              <a:t>09.04.2024</a:t>
+              <a:t>27.03.2025</a:t>
             </a:fld>
             <a:endParaRPr lang="cs-CZ"/>
           </a:p>
@@ -1260,7 +1260,7 @@
           <a:p>
             <a:fld id="{0DA6F2F8-F70A-47D7-AD2D-4F12E71A0C18}" type="datetimeFigureOut">
               <a:rPr lang="cs-CZ" smtClean="0"/>
-              <a:t>09.04.2024</a:t>
+              <a:t>27.03.2025</a:t>
             </a:fld>
             <a:endParaRPr lang="cs-CZ"/>
           </a:p>
@@ -1475,7 +1475,7 @@
           <a:p>
             <a:fld id="{0DA6F2F8-F70A-47D7-AD2D-4F12E71A0C18}" type="datetimeFigureOut">
               <a:rPr lang="cs-CZ" smtClean="0"/>
-              <a:t>09.04.2024</a:t>
+              <a:t>27.03.2025</a:t>
             </a:fld>
             <a:endParaRPr lang="cs-CZ"/>
           </a:p>
@@ -1750,7 +1750,7 @@
           <a:p>
             <a:fld id="{0DA6F2F8-F70A-47D7-AD2D-4F12E71A0C18}" type="datetimeFigureOut">
               <a:rPr lang="cs-CZ" smtClean="0"/>
-              <a:t>09.04.2024</a:t>
+              <a:t>27.03.2025</a:t>
             </a:fld>
             <a:endParaRPr lang="cs-CZ"/>
           </a:p>
@@ -2067,7 +2067,7 @@
           <a:p>
             <a:fld id="{0DA6F2F8-F70A-47D7-AD2D-4F12E71A0C18}" type="datetimeFigureOut">
               <a:rPr lang="cs-CZ" smtClean="0"/>
-              <a:t>09.04.2024</a:t>
+              <a:t>27.03.2025</a:t>
             </a:fld>
             <a:endParaRPr lang="cs-CZ" dirty="0"/>
           </a:p>
@@ -2517,7 +2517,7 @@
           <a:p>
             <a:fld id="{0DA6F2F8-F70A-47D7-AD2D-4F12E71A0C18}" type="datetimeFigureOut">
               <a:rPr lang="cs-CZ" smtClean="0"/>
-              <a:t>09.04.2024</a:t>
+              <a:t>27.03.2025</a:t>
             </a:fld>
             <a:endParaRPr lang="cs-CZ"/>
           </a:p>
@@ -2664,7 +2664,7 @@
           <a:p>
             <a:fld id="{0DA6F2F8-F70A-47D7-AD2D-4F12E71A0C18}" type="datetimeFigureOut">
               <a:rPr lang="cs-CZ" smtClean="0"/>
-              <a:t>09.04.2024</a:t>
+              <a:t>27.03.2025</a:t>
             </a:fld>
             <a:endParaRPr lang="cs-CZ"/>
           </a:p>
@@ -2771,7 +2771,7 @@
           <a:p>
             <a:fld id="{0DA6F2F8-F70A-47D7-AD2D-4F12E71A0C18}" type="datetimeFigureOut">
               <a:rPr lang="cs-CZ" smtClean="0"/>
-              <a:t>09.04.2024</a:t>
+              <a:t>27.03.2025</a:t>
             </a:fld>
             <a:endParaRPr lang="cs-CZ"/>
           </a:p>
@@ -3062,7 +3062,7 @@
           <a:p>
             <a:fld id="{0DA6F2F8-F70A-47D7-AD2D-4F12E71A0C18}" type="datetimeFigureOut">
               <a:rPr lang="cs-CZ" smtClean="0"/>
-              <a:t>09.04.2024</a:t>
+              <a:t>27.03.2025</a:t>
             </a:fld>
             <a:endParaRPr lang="cs-CZ"/>
           </a:p>
@@ -3331,7 +3331,7 @@
           <a:p>
             <a:fld id="{0DA6F2F8-F70A-47D7-AD2D-4F12E71A0C18}" type="datetimeFigureOut">
               <a:rPr lang="cs-CZ" smtClean="0"/>
-              <a:t>09.04.2024</a:t>
+              <a:t>27.03.2025</a:t>
             </a:fld>
             <a:endParaRPr lang="cs-CZ"/>
           </a:p>
@@ -3595,7 +3595,7 @@
           <a:p>
             <a:fld id="{0DA6F2F8-F70A-47D7-AD2D-4F12E71A0C18}" type="datetimeFigureOut">
               <a:rPr lang="cs-CZ" smtClean="0"/>
-              <a:t>09.04.2024</a:t>
+              <a:t>27.03.2025</a:t>
             </a:fld>
             <a:endParaRPr lang="cs-CZ"/>
           </a:p>
@@ -4050,7 +4050,7 @@
           <a:p>
             <a:r>
               <a:rPr lang="en-US" sz="2000" dirty="0"/>
-              <a:t>Software engineer, HAVIT, </a:t>
+              <a:t>Software architect, HAVIT, </a:t>
             </a:r>
             <a:r>
               <a:rPr lang="en-US" sz="2000" dirty="0" err="1"/>
@@ -4223,29 +4223,29 @@
               </a:rPr>
               <a:t>Vision</a:t>
             </a:r>
-            <a:endParaRPr lang="cs-CZ" dirty="0"/>
+            <a:endParaRPr lang="en-US" dirty="0"/>
           </a:p>
           <a:p>
             <a:r>
               <a:rPr lang="en-US" dirty="0">
                 <a:hlinkClick r:id="rId4"/>
               </a:rPr>
-              <a:t>Azure AI </a:t>
-            </a:r>
-            <a:r>
-              <a:rPr lang="cs-CZ" dirty="0">
-                <a:hlinkClick r:id="rId4"/>
-              </a:rPr>
-              <a:t>Speech</a:t>
-            </a:r>
-            <a:endParaRPr lang="en-US" dirty="0"/>
+              <a:t>Azure AI Model Catalog</a:t>
+            </a:r>
+            <a:endParaRPr lang="cs-CZ" dirty="0"/>
           </a:p>
           <a:p>
             <a:r>
               <a:rPr lang="en-US" dirty="0">
                 <a:hlinkClick r:id="rId5"/>
               </a:rPr>
-              <a:t>Azure AI Language</a:t>
+              <a:t>Azure AI </a:t>
+            </a:r>
+            <a:r>
+              <a:rPr lang="cs-CZ" dirty="0">
+                <a:hlinkClick r:id="rId5"/>
+              </a:rPr>
+              <a:t>Speech</a:t>
             </a:r>
             <a:endParaRPr lang="en-US" dirty="0"/>
           </a:p>
@@ -4254,7 +4254,25 @@
               <a:rPr lang="en-US" dirty="0">
                 <a:hlinkClick r:id="rId6"/>
               </a:rPr>
-              <a:t>Azure AI Translation</a:t>
+              <a:t>Azure AI Language</a:t>
+            </a:r>
+            <a:endParaRPr lang="en-US" dirty="0"/>
+          </a:p>
+          <a:p>
+            <a:r>
+              <a:rPr lang="en-US" dirty="0">
+                <a:hlinkClick r:id="rId7"/>
+              </a:rPr>
+              <a:t>Azure AI Translator</a:t>
+            </a:r>
+            <a:endParaRPr lang="en-US" dirty="0"/>
+          </a:p>
+          <a:p>
+            <a:r>
+              <a:rPr lang="en-US" dirty="0">
+                <a:hlinkClick r:id="rId8"/>
+              </a:rPr>
+              <a:t>Azure AI Foundry</a:t>
             </a:r>
             <a:endParaRPr lang="en-US" dirty="0"/>
           </a:p>
@@ -4291,7 +4309,7 @@
           <a:p>
             <a:r>
               <a:rPr lang="en-US" dirty="0">
-                <a:hlinkClick r:id="rId7"/>
+                <a:hlinkClick r:id="rId9"/>
               </a:rPr>
               <a:t>Azure AI Search</a:t>
             </a:r>
@@ -4300,59 +4318,11 @@
           <a:p>
             <a:r>
               <a:rPr lang="en-US" dirty="0">
-                <a:hlinkClick r:id="rId8"/>
+                <a:hlinkClick r:id="rId10"/>
               </a:rPr>
               <a:t>Azure AI Content Safety</a:t>
             </a:r>
             <a:endParaRPr lang="en-US" dirty="0"/>
-          </a:p>
-          <a:p>
-            <a:r>
-              <a:rPr lang="en-US" dirty="0">
-                <a:solidFill>
-                  <a:srgbClr val="000000"/>
-                </a:solidFill>
-                <a:highlight>
-                  <a:srgbClr val="FFFFFF"/>
-                </a:highlight>
-                <a:latin typeface="Segoe UI" panose="020B0502040204020203" pitchFamily="34" charset="0"/>
-                <a:hlinkClick r:id="rId9"/>
-              </a:rPr>
-              <a:t>Azure Machine Learning</a:t>
-            </a:r>
-            <a:endParaRPr lang="en-US" dirty="0">
-              <a:solidFill>
-                <a:srgbClr val="000000"/>
-              </a:solidFill>
-              <a:highlight>
-                <a:srgbClr val="FFFFFF"/>
-              </a:highlight>
-              <a:latin typeface="Segoe UI" panose="020B0502040204020203" pitchFamily="34" charset="0"/>
-            </a:endParaRPr>
-          </a:p>
-          <a:p>
-            <a:r>
-              <a:rPr lang="en-US" dirty="0">
-                <a:solidFill>
-                  <a:srgbClr val="000000"/>
-                </a:solidFill>
-                <a:highlight>
-                  <a:srgbClr val="FFFFFF"/>
-                </a:highlight>
-                <a:latin typeface="Segoe UI" panose="020B0502040204020203" pitchFamily="34" charset="0"/>
-                <a:hlinkClick r:id="rId10"/>
-              </a:rPr>
-              <a:t>Azure AI Document Intelligence</a:t>
-            </a:r>
-            <a:endParaRPr lang="en-US" dirty="0">
-              <a:solidFill>
-                <a:srgbClr val="000000"/>
-              </a:solidFill>
-              <a:highlight>
-                <a:srgbClr val="FFFFFF"/>
-              </a:highlight>
-              <a:latin typeface="Segoe UI" panose="020B0502040204020203" pitchFamily="34" charset="0"/>
-            </a:endParaRPr>
           </a:p>
           <a:p>
             <a:r>
@@ -4366,7 +4336,7 @@
                 <a:latin typeface="Segoe UI" panose="020B0502040204020203" pitchFamily="34" charset="0"/>
                 <a:hlinkClick r:id="rId11"/>
               </a:rPr>
-              <a:t>Azure AI Video Indexer</a:t>
+              <a:t>Azure Machine Learning</a:t>
             </a:r>
             <a:endParaRPr lang="en-US" dirty="0">
               <a:solidFill>
@@ -4390,7 +4360,55 @@
                 <a:latin typeface="Segoe UI" panose="020B0502040204020203" pitchFamily="34" charset="0"/>
                 <a:hlinkClick r:id="rId12"/>
               </a:rPr>
-              <a:t>Microsoft Copilot for Security</a:t>
+              <a:t>Azure AI Document Intelligence</a:t>
+            </a:r>
+            <a:endParaRPr lang="en-US" dirty="0">
+              <a:solidFill>
+                <a:srgbClr val="000000"/>
+              </a:solidFill>
+              <a:highlight>
+                <a:srgbClr val="FFFFFF"/>
+              </a:highlight>
+              <a:latin typeface="Segoe UI" panose="020B0502040204020203" pitchFamily="34" charset="0"/>
+            </a:endParaRPr>
+          </a:p>
+          <a:p>
+            <a:r>
+              <a:rPr lang="en-US" dirty="0">
+                <a:solidFill>
+                  <a:srgbClr val="000000"/>
+                </a:solidFill>
+                <a:highlight>
+                  <a:srgbClr val="FFFFFF"/>
+                </a:highlight>
+                <a:latin typeface="Segoe UI" panose="020B0502040204020203" pitchFamily="34" charset="0"/>
+                <a:hlinkClick r:id="rId13"/>
+              </a:rPr>
+              <a:t>Azure AI Video Indexer</a:t>
+            </a:r>
+            <a:endParaRPr lang="en-US" dirty="0">
+              <a:solidFill>
+                <a:srgbClr val="000000"/>
+              </a:solidFill>
+              <a:highlight>
+                <a:srgbClr val="FFFFFF"/>
+              </a:highlight>
+              <a:latin typeface="Segoe UI" panose="020B0502040204020203" pitchFamily="34" charset="0"/>
+            </a:endParaRPr>
+          </a:p>
+          <a:p>
+            <a:r>
+              <a:rPr lang="en-US" dirty="0">
+                <a:solidFill>
+                  <a:srgbClr val="000000"/>
+                </a:solidFill>
+                <a:highlight>
+                  <a:srgbClr val="FFFFFF"/>
+                </a:highlight>
+                <a:latin typeface="Segoe UI" panose="020B0502040204020203" pitchFamily="34" charset="0"/>
+                <a:hlinkClick r:id="rId14"/>
+              </a:rPr>
+              <a:t>Microsoft Copilot in Azure</a:t>
             </a:r>
             <a:endParaRPr lang="en-US" dirty="0"/>
           </a:p>
@@ -4401,10 +4419,10 @@
       </p:sp>
       <p:sp>
         <p:nvSpPr>
-          <p:cNvPr id="5" name="TextBox 4">
+          <p:cNvPr id="6" name="TextovéPole 5">
             <a:extLst>
               <a:ext uri="{FF2B5EF4-FFF2-40B4-BE49-F238E27FC236}">
-                <a16:creationId xmlns:a16="http://schemas.microsoft.com/office/drawing/2014/main" id="{39003005-B49E-90D0-BD76-9596C8CB1D82}"/>
+                <a16:creationId xmlns:a16="http://schemas.microsoft.com/office/drawing/2014/main" id="{848AA9BB-18BC-7F23-ADA0-B1187667E539}"/>
               </a:ext>
             </a:extLst>
           </p:cNvPr>
@@ -4413,8 +4431,8 @@
         </p:nvSpPr>
         <p:spPr>
           <a:xfrm>
-            <a:off x="862112" y="6021288"/>
-            <a:ext cx="10670976" cy="369332"/>
+            <a:off x="609600" y="5805264"/>
+            <a:ext cx="10742984" cy="369332"/>
           </a:xfrm>
           <a:prstGeom prst="rect">
             <a:avLst/>
@@ -4429,12 +4447,19 @@
           <a:p>
             <a:r>
               <a:rPr lang="en-US" dirty="0"/>
-              <a:t>Test console: </a:t>
-            </a:r>
-            <a:r>
-              <a:rPr lang="cs-CZ" dirty="0"/>
-              <a:t>https://westeurope.dev.cognitive.microsoft.com/docs/services/computer-vision-v3-2/</a:t>
-            </a:r>
+              <a:t>Microsoft AI Skills Fest 8.4.2025 – 28.5.2025 (</a:t>
+            </a:r>
+            <a:r>
+              <a:rPr lang="en-US" dirty="0">
+                <a:hlinkClick r:id="rId15"/>
+              </a:rPr>
+              <a:t>link</a:t>
+            </a:r>
+            <a:r>
+              <a:rPr lang="en-US" dirty="0"/>
+              <a:t>)</a:t>
+            </a:r>
+            <a:endParaRPr lang="cs-CZ" dirty="0"/>
           </a:p>
         </p:txBody>
       </p:sp>
@@ -4464,7 +4489,7 @@
 </file>
 
 <file path=ppt/slides/slide3.xml><?xml version="1.0" encoding="utf-8"?>
-<p:sld xmlns:a="http://schemas.openxmlformats.org/drawingml/2006/main" xmlns:r="http://schemas.openxmlformats.org/officeDocument/2006/relationships" xmlns:p="http://schemas.openxmlformats.org/presentationml/2006/main">
+<p:sld xmlns:a="http://schemas.openxmlformats.org/drawingml/2006/main" xmlns:r="http://schemas.openxmlformats.org/officeDocument/2006/relationships" xmlns:p="http://schemas.openxmlformats.org/presentationml/2006/main" show="0">
   <p:cSld>
     <p:spTree>
       <p:nvGrpSpPr>
@@ -4715,13 +4740,13 @@
   <p:clrMapOvr>
     <a:masterClrMapping/>
   </p:clrMapOvr>
-  <mc:AlternateContent xmlns:mc="http://schemas.openxmlformats.org/markup-compatibility/2006" xmlns:p14="http://schemas.microsoft.com/office/powerpoint/2010/main">
-    <mc:Choice Requires="p14">
+  <mc:AlternateContent xmlns:mc="http://schemas.openxmlformats.org/markup-compatibility/2006">
+    <mc:Choice xmlns:p14="http://schemas.microsoft.com/office/powerpoint/2010/main" Requires="p14">
       <p:transition spd="med" p14:dur="700">
         <p:fade/>
       </p:transition>
     </mc:Choice>
-    <mc:Fallback xmlns="">
+    <mc:Fallback>
       <p:transition spd="med">
         <p:fade/>
       </p:transition>
@@ -5262,7 +5287,7 @@
         <p:spPr/>
         <p:txBody>
           <a:bodyPr>
-            <a:normAutofit fontScale="92500" lnSpcReduction="10000"/>
+            <a:normAutofit fontScale="92500" lnSpcReduction="20000"/>
           </a:bodyPr>
           <a:lstStyle/>
           <a:p>
@@ -5336,6 +5361,15 @@
                 <a:hlinkClick r:id="rId3"/>
               </a:rPr>
               <a:t>Language studio</a:t>
+            </a:r>
+            <a:endParaRPr lang="en-US" dirty="0"/>
+          </a:p>
+          <a:p>
+            <a:r>
+              <a:rPr lang="en-US" dirty="0">
+                <a:hlinkClick r:id="rId4"/>
+              </a:rPr>
+              <a:t>AI Foundry / Language </a:t>
             </a:r>
             <a:endParaRPr lang="en-US" dirty="0"/>
           </a:p>

</xml_diff>